<commit_message>
updates after the first run in 2023
</commit_message>
<xml_diff>
--- a/instructors/03-Tools_for_overlords.pptx
+++ b/instructors/03-Tools_for_overlords.pptx
@@ -5,7 +5,7 @@
     <p:sldMasterId id="2147483648" r:id="rId1"/>
   </p:sldMasterIdLst>
   <p:notesMasterIdLst>
-    <p:notesMasterId r:id="rId14"/>
+    <p:notesMasterId r:id="rId15"/>
   </p:notesMasterIdLst>
   <p:sldIdLst>
     <p:sldId id="256" r:id="rId2"/>
@@ -19,7 +19,8 @@
     <p:sldId id="284" r:id="rId10"/>
     <p:sldId id="293" r:id="rId11"/>
     <p:sldId id="258" r:id="rId12"/>
-    <p:sldId id="294" r:id="rId13"/>
+    <p:sldId id="295" r:id="rId13"/>
+    <p:sldId id="294" r:id="rId14"/>
   </p:sldIdLst>
   <p:sldSz cx="12192000" cy="6858000"/>
   <p:notesSz cx="6858000" cy="9144000"/>
@@ -208,7 +209,7 @@
           <a:p>
             <a:fld id="{AA8A194F-1EDC-44D6-902F-D21F13A5BCE4}" type="datetimeFigureOut">
               <a:rPr lang="en-GB" smtClean="0"/>
-              <a:t>14/12/2022</a:t>
+              <a:t>16/12/2022</a:t>
             </a:fld>
             <a:endParaRPr lang="en-GB"/>
           </a:p>
@@ -642,7 +643,7 @@
             <a:fld id="{DE72BEAC-A25F-4480-8AFC-1D3E290F2CC8}" type="datetimeFigureOut">
               <a:rPr lang="en-GB" smtClean="0"/>
               <a:pPr/>
-              <a:t>14/12/2022</a:t>
+              <a:t>16/12/2022</a:t>
             </a:fld>
             <a:endParaRPr lang="en-GB" dirty="0"/>
           </a:p>
@@ -906,7 +907,7 @@
           <a:p>
             <a:fld id="{DE72BEAC-A25F-4480-8AFC-1D3E290F2CC8}" type="datetimeFigureOut">
               <a:rPr lang="en-GB" smtClean="0"/>
-              <a:t>14/12/2022</a:t>
+              <a:t>16/12/2022</a:t>
             </a:fld>
             <a:endParaRPr lang="en-GB" dirty="0"/>
           </a:p>
@@ -1116,7 +1117,7 @@
           <a:p>
             <a:fld id="{DE72BEAC-A25F-4480-8AFC-1D3E290F2CC8}" type="datetimeFigureOut">
               <a:rPr lang="en-GB" smtClean="0"/>
-              <a:t>14/12/2022</a:t>
+              <a:t>16/12/2022</a:t>
             </a:fld>
             <a:endParaRPr lang="en-GB" dirty="0"/>
           </a:p>
@@ -1316,7 +1317,7 @@
           <a:p>
             <a:fld id="{DE72BEAC-A25F-4480-8AFC-1D3E290F2CC8}" type="datetimeFigureOut">
               <a:rPr lang="en-GB" smtClean="0"/>
-              <a:t>14/12/2022</a:t>
+              <a:t>16/12/2022</a:t>
             </a:fld>
             <a:endParaRPr lang="en-GB" dirty="0"/>
           </a:p>
@@ -1592,7 +1593,7 @@
           <a:p>
             <a:fld id="{DE72BEAC-A25F-4480-8AFC-1D3E290F2CC8}" type="datetimeFigureOut">
               <a:rPr lang="en-GB" smtClean="0"/>
-              <a:t>14/12/2022</a:t>
+              <a:t>16/12/2022</a:t>
             </a:fld>
             <a:endParaRPr lang="en-GB" dirty="0"/>
           </a:p>
@@ -1860,7 +1861,7 @@
           <a:p>
             <a:fld id="{DE72BEAC-A25F-4480-8AFC-1D3E290F2CC8}" type="datetimeFigureOut">
               <a:rPr lang="en-GB" smtClean="0"/>
-              <a:t>14/12/2022</a:t>
+              <a:t>16/12/2022</a:t>
             </a:fld>
             <a:endParaRPr lang="en-GB" dirty="0"/>
           </a:p>
@@ -2275,7 +2276,7 @@
           <a:p>
             <a:fld id="{DE72BEAC-A25F-4480-8AFC-1D3E290F2CC8}" type="datetimeFigureOut">
               <a:rPr lang="en-GB" smtClean="0"/>
-              <a:t>14/12/2022</a:t>
+              <a:t>16/12/2022</a:t>
             </a:fld>
             <a:endParaRPr lang="en-GB" dirty="0"/>
           </a:p>
@@ -2417,7 +2418,7 @@
           <a:p>
             <a:fld id="{DE72BEAC-A25F-4480-8AFC-1D3E290F2CC8}" type="datetimeFigureOut">
               <a:rPr lang="en-GB" smtClean="0"/>
-              <a:t>14/12/2022</a:t>
+              <a:t>16/12/2022</a:t>
             </a:fld>
             <a:endParaRPr lang="en-GB" dirty="0"/>
           </a:p>
@@ -2530,7 +2531,7 @@
           <a:p>
             <a:fld id="{DE72BEAC-A25F-4480-8AFC-1D3E290F2CC8}" type="datetimeFigureOut">
               <a:rPr lang="en-GB" smtClean="0"/>
-              <a:t>14/12/2022</a:t>
+              <a:t>16/12/2022</a:t>
             </a:fld>
             <a:endParaRPr lang="en-GB" dirty="0"/>
           </a:p>
@@ -2843,7 +2844,7 @@
           <a:p>
             <a:fld id="{DE72BEAC-A25F-4480-8AFC-1D3E290F2CC8}" type="datetimeFigureOut">
               <a:rPr lang="en-GB" smtClean="0"/>
-              <a:t>14/12/2022</a:t>
+              <a:t>16/12/2022</a:t>
             </a:fld>
             <a:endParaRPr lang="en-GB" dirty="0"/>
           </a:p>
@@ -3132,7 +3133,7 @@
           <a:p>
             <a:fld id="{DE72BEAC-A25F-4480-8AFC-1D3E290F2CC8}" type="datetimeFigureOut">
               <a:rPr lang="en-GB" smtClean="0"/>
-              <a:t>14/12/2022</a:t>
+              <a:t>16/12/2022</a:t>
             </a:fld>
             <a:endParaRPr lang="en-GB" dirty="0"/>
           </a:p>
@@ -3374,7 +3375,7 @@
             <a:fld id="{DE72BEAC-A25F-4480-8AFC-1D3E290F2CC8}" type="datetimeFigureOut">
               <a:rPr lang="en-GB" smtClean="0"/>
               <a:pPr/>
-              <a:t>14/12/2022</a:t>
+              <a:t>16/12/2022</a:t>
             </a:fld>
             <a:endParaRPr lang="en-GB" dirty="0"/>
           </a:p>
@@ -4211,7 +4212,6 @@
               <a:rPr lang="en-GB" dirty="0" smtClean="0"/>
               <a:t> live</a:t>
             </a:r>
-            <a:endParaRPr lang="en-GB" dirty="0" smtClean="0"/>
           </a:p>
           <a:p>
             <a:pPr marL="0" indent="0">
@@ -4287,7 +4287,11 @@
           <a:p>
             <a:r>
               <a:rPr lang="en-GB" dirty="0"/>
-              <a:t>Tools and the management</a:t>
+              <a:t>Tools and </a:t>
+            </a:r>
+            <a:r>
+              <a:rPr lang="en-GB" dirty="0" smtClean="0"/>
+              <a:t>management</a:t>
             </a:r>
             <a:endParaRPr lang="en-GB" dirty="0"/>
           </a:p>
@@ -4395,6 +4399,91 @@
       </p:sp>
       <p:sp>
         <p:nvSpPr>
+          <p:cNvPr id="4" name="Content Placeholder 3"/>
+          <p:cNvSpPr>
+            <a:spLocks noGrp="1"/>
+          </p:cNvSpPr>
+          <p:nvPr>
+            <p:ph idx="1"/>
+          </p:nvPr>
+        </p:nvSpPr>
+        <p:spPr/>
+        <p:txBody>
+          <a:bodyPr/>
+          <a:lstStyle/>
+          <a:p>
+            <a:endParaRPr lang="en-GB"/>
+          </a:p>
+        </p:txBody>
+      </p:sp>
+    </p:spTree>
+    <p:extLst>
+      <p:ext uri="{BB962C8B-B14F-4D97-AF65-F5344CB8AC3E}">
+        <p14:creationId xmlns:p14="http://schemas.microsoft.com/office/powerpoint/2010/main" val="3442810475"/>
+      </p:ext>
+    </p:extLst>
+  </p:cSld>
+  <p:clrMapOvr>
+    <a:masterClrMapping/>
+  </p:clrMapOvr>
+  <p:timing>
+    <p:tnLst>
+      <p:par>
+        <p:cTn id="1" dur="indefinite" restart="never" nodeType="tmRoot"/>
+      </p:par>
+    </p:tnLst>
+  </p:timing>
+</p:sld>
+</file>
+
+<file path=ppt/slides/slide13.xml><?xml version="1.0" encoding="utf-8"?>
+<p:sld xmlns:a="http://schemas.openxmlformats.org/drawingml/2006/main" xmlns:r="http://schemas.openxmlformats.org/officeDocument/2006/relationships" xmlns:p="http://schemas.openxmlformats.org/presentationml/2006/main">
+  <p:cSld>
+    <p:spTree>
+      <p:nvGrpSpPr>
+        <p:cNvPr id="1" name=""/>
+        <p:cNvGrpSpPr/>
+        <p:nvPr/>
+      </p:nvGrpSpPr>
+      <p:grpSpPr>
+        <a:xfrm>
+          <a:off x="0" y="0"/>
+          <a:ext cx="0" cy="0"/>
+          <a:chOff x="0" y="0"/>
+          <a:chExt cx="0" cy="0"/>
+        </a:xfrm>
+      </p:grpSpPr>
+      <p:sp>
+        <p:nvSpPr>
+          <p:cNvPr id="2" name="Title 1">
+            <a:extLst>
+              <a:ext uri="{FF2B5EF4-FFF2-40B4-BE49-F238E27FC236}">
+                <a16:creationId xmlns:a16="http://schemas.microsoft.com/office/drawing/2014/main" id="{A7F62DF9-134C-4023-A338-A983DBB67D3D}"/>
+              </a:ext>
+            </a:extLst>
+          </p:cNvPr>
+          <p:cNvSpPr>
+            <a:spLocks noGrp="1"/>
+          </p:cNvSpPr>
+          <p:nvPr>
+            <p:ph type="title"/>
+          </p:nvPr>
+        </p:nvSpPr>
+        <p:spPr/>
+        <p:txBody>
+          <a:bodyPr/>
+          <a:lstStyle/>
+          <a:p>
+            <a:r>
+              <a:rPr lang="en-GB" dirty="0" smtClean="0"/>
+              <a:t>Learning curve</a:t>
+            </a:r>
+            <a:endParaRPr lang="en-GB" dirty="0"/>
+          </a:p>
+        </p:txBody>
+      </p:sp>
+      <p:sp>
+        <p:nvSpPr>
           <p:cNvPr id="3" name="Content Placeholder 2">
             <a:extLst>
               <a:ext uri="{FF2B5EF4-FFF2-40B4-BE49-F238E27FC236}">
@@ -4416,7 +4505,7 @@
           <a:p>
             <a:r>
               <a:rPr lang="en-GB" dirty="0" smtClean="0"/>
-              <a:t>Where the things are online</a:t>
+              <a:t>Where things are online</a:t>
             </a:r>
           </a:p>
           <a:p>
@@ -4452,7 +4541,7 @@
             </a:pPr>
             <a:r>
               <a:rPr lang="en-GB" dirty="0" smtClean="0"/>
-              <a:t>Consuming content is much easier than creating it!!!</a:t>
+              <a:t>Consuming/annotating content is much easier than creating it!!!</a:t>
             </a:r>
           </a:p>
           <a:p>
@@ -4586,7 +4675,6 @@
               <a:rPr lang="en-GB" dirty="0"/>
               <a:t>s for data analysis</a:t>
             </a:r>
-            <a:endParaRPr lang="en-GB" dirty="0"/>
           </a:p>
         </p:txBody>
       </p:sp>
@@ -5648,11 +5736,6 @@
               </a:rPr>
               <a:t>My directory is polluted with a lot of unused/temporary/old folders because I'm afraid of losing something important </a:t>
             </a:r>
-            <a:endParaRPr lang="en-GB" sz="2800" dirty="0">
-              <a:solidFill>
-                <a:srgbClr val="0070C0"/>
-              </a:solidFill>
-            </a:endParaRPr>
           </a:p>
         </p:txBody>
       </p:sp>
@@ -5767,8 +5850,21 @@
                   <a:srgbClr val="0070C0"/>
                 </a:solidFill>
               </a:rPr>
-              <a:t>Addressing those issues by tracking changes is called version control. .</a:t>
-            </a:r>
+              <a:t>Addressing those issues by tracking changes is called version </a:t>
+            </a:r>
+            <a:r>
+              <a:rPr lang="en-GB" sz="2800" dirty="0" smtClean="0">
+                <a:solidFill>
+                  <a:srgbClr val="0070C0"/>
+                </a:solidFill>
+              </a:rPr>
+              <a:t>control.</a:t>
+            </a:r>
+            <a:endParaRPr lang="en-GB" sz="2800" dirty="0">
+              <a:solidFill>
+                <a:srgbClr val="0070C0"/>
+              </a:solidFill>
+            </a:endParaRPr>
           </a:p>
           <a:p>
             <a:endParaRPr lang="en-GB" sz="2800" dirty="0">
@@ -5993,7 +6089,6 @@
               <a:rPr lang="en-GB" dirty="0" smtClean="0"/>
               <a:t>GitHub live</a:t>
             </a:r>
-            <a:endParaRPr lang="en-GB" dirty="0" smtClean="0"/>
           </a:p>
           <a:p>
             <a:pPr marL="0" indent="0">

</xml_diff>